<commit_message>
Updates to PPT and PolyChaos.jl implementation
Finished PolyChaos.jl implementation for two bilinear models.
</commit_message>
<xml_diff>
--- a/ppt/optimization/powerpoint.pptx
+++ b/ppt/optimization/powerpoint.pptx
@@ -5,7 +5,7 @@
     <p:sldMasterId id="2147483648" r:id="rId1"/>
   </p:sldMasterIdLst>
   <p:notesMasterIdLst>
-    <p:notesMasterId r:id="rId11"/>
+    <p:notesMasterId r:id="rId14"/>
   </p:notesMasterIdLst>
   <p:sldIdLst>
     <p:sldId id="256" r:id="rId2"/>
@@ -17,6 +17,9 @@
     <p:sldId id="263" r:id="rId8"/>
     <p:sldId id="260" r:id="rId9"/>
     <p:sldId id="264" r:id="rId10"/>
+    <p:sldId id="265" r:id="rId11"/>
+    <p:sldId id="267" r:id="rId12"/>
+    <p:sldId id="266" r:id="rId13"/>
   </p:sldIdLst>
   <p:sldSz cx="12192000" cy="6858000"/>
   <p:notesSz cx="6858000" cy="9144000"/>
@@ -205,7 +208,7 @@
           <a:p>
             <a:fld id="{A917C772-F136-FF43-85BC-66B60A4E318B}" type="datetimeFigureOut">
               <a:rPr lang="en-US" smtClean="0"/>
-              <a:t>6/6/24</a:t>
+              <a:t>6/10/24</a:t>
             </a:fld>
             <a:endParaRPr lang="en-US"/>
           </a:p>
@@ -703,7 +706,7 @@
           <a:p>
             <a:fld id="{6C73C5F4-5120-0D43-B87E-D198AC85C05C}" type="datetimeFigureOut">
               <a:rPr lang="en-US" smtClean="0"/>
-              <a:t>6/6/24</a:t>
+              <a:t>6/10/24</a:t>
             </a:fld>
             <a:endParaRPr lang="en-US"/>
           </a:p>
@@ -901,7 +904,7 @@
           <a:p>
             <a:fld id="{6C73C5F4-5120-0D43-B87E-D198AC85C05C}" type="datetimeFigureOut">
               <a:rPr lang="en-US" smtClean="0"/>
-              <a:t>6/6/24</a:t>
+              <a:t>6/10/24</a:t>
             </a:fld>
             <a:endParaRPr lang="en-US"/>
           </a:p>
@@ -1109,7 +1112,7 @@
           <a:p>
             <a:fld id="{6C73C5F4-5120-0D43-B87E-D198AC85C05C}" type="datetimeFigureOut">
               <a:rPr lang="en-US" smtClean="0"/>
-              <a:t>6/6/24</a:t>
+              <a:t>6/10/24</a:t>
             </a:fld>
             <a:endParaRPr lang="en-US"/>
           </a:p>
@@ -1307,7 +1310,7 @@
           <a:p>
             <a:fld id="{6C73C5F4-5120-0D43-B87E-D198AC85C05C}" type="datetimeFigureOut">
               <a:rPr lang="en-US" smtClean="0"/>
-              <a:t>6/6/24</a:t>
+              <a:t>6/10/24</a:t>
             </a:fld>
             <a:endParaRPr lang="en-US"/>
           </a:p>
@@ -1582,7 +1585,7 @@
           <a:p>
             <a:fld id="{6C73C5F4-5120-0D43-B87E-D198AC85C05C}" type="datetimeFigureOut">
               <a:rPr lang="en-US" smtClean="0"/>
-              <a:t>6/6/24</a:t>
+              <a:t>6/10/24</a:t>
             </a:fld>
             <a:endParaRPr lang="en-US"/>
           </a:p>
@@ -1847,7 +1850,7 @@
           <a:p>
             <a:fld id="{6C73C5F4-5120-0D43-B87E-D198AC85C05C}" type="datetimeFigureOut">
               <a:rPr lang="en-US" smtClean="0"/>
-              <a:t>6/6/24</a:t>
+              <a:t>6/10/24</a:t>
             </a:fld>
             <a:endParaRPr lang="en-US"/>
           </a:p>
@@ -2259,7 +2262,7 @@
           <a:p>
             <a:fld id="{6C73C5F4-5120-0D43-B87E-D198AC85C05C}" type="datetimeFigureOut">
               <a:rPr lang="en-US" smtClean="0"/>
-              <a:t>6/6/24</a:t>
+              <a:t>6/10/24</a:t>
             </a:fld>
             <a:endParaRPr lang="en-US"/>
           </a:p>
@@ -2400,7 +2403,7 @@
           <a:p>
             <a:fld id="{6C73C5F4-5120-0D43-B87E-D198AC85C05C}" type="datetimeFigureOut">
               <a:rPr lang="en-US" smtClean="0"/>
-              <a:t>6/6/24</a:t>
+              <a:t>6/10/24</a:t>
             </a:fld>
             <a:endParaRPr lang="en-US"/>
           </a:p>
@@ -2513,7 +2516,7 @@
           <a:p>
             <a:fld id="{6C73C5F4-5120-0D43-B87E-D198AC85C05C}" type="datetimeFigureOut">
               <a:rPr lang="en-US" smtClean="0"/>
-              <a:t>6/6/24</a:t>
+              <a:t>6/10/24</a:t>
             </a:fld>
             <a:endParaRPr lang="en-US"/>
           </a:p>
@@ -2824,7 +2827,7 @@
           <a:p>
             <a:fld id="{6C73C5F4-5120-0D43-B87E-D198AC85C05C}" type="datetimeFigureOut">
               <a:rPr lang="en-US" smtClean="0"/>
-              <a:t>6/6/24</a:t>
+              <a:t>6/10/24</a:t>
             </a:fld>
             <a:endParaRPr lang="en-US"/>
           </a:p>
@@ -3112,7 +3115,7 @@
           <a:p>
             <a:fld id="{6C73C5F4-5120-0D43-B87E-D198AC85C05C}" type="datetimeFigureOut">
               <a:rPr lang="en-US" smtClean="0"/>
-              <a:t>6/6/24</a:t>
+              <a:t>6/10/24</a:t>
             </a:fld>
             <a:endParaRPr lang="en-US"/>
           </a:p>
@@ -3353,7 +3356,7 @@
           <a:p>
             <a:fld id="{6C73C5F4-5120-0D43-B87E-D198AC85C05C}" type="datetimeFigureOut">
               <a:rPr lang="en-US" smtClean="0"/>
-              <a:t>6/6/24</a:t>
+              <a:t>6/10/24</a:t>
             </a:fld>
             <a:endParaRPr lang="en-US"/>
           </a:p>
@@ -3856,6 +3859,482 @@
 </p:sld>
 </file>
 
+<file path=ppt/slides/slide10.xml><?xml version="1.0" encoding="utf-8"?>
+<p:sld xmlns:a="http://schemas.openxmlformats.org/drawingml/2006/main" xmlns:r="http://schemas.openxmlformats.org/officeDocument/2006/relationships" xmlns:p="http://schemas.openxmlformats.org/presentationml/2006/main">
+  <p:cSld>
+    <p:spTree>
+      <p:nvGrpSpPr>
+        <p:cNvPr id="1" name=""/>
+        <p:cNvGrpSpPr/>
+        <p:nvPr/>
+      </p:nvGrpSpPr>
+      <p:grpSpPr>
+        <a:xfrm>
+          <a:off x="0" y="0"/>
+          <a:ext cx="0" cy="0"/>
+          <a:chOff x="0" y="0"/>
+          <a:chExt cx="0" cy="0"/>
+        </a:xfrm>
+      </p:grpSpPr>
+      <p:sp>
+        <p:nvSpPr>
+          <p:cNvPr id="2" name="Title 1">
+            <a:extLst>
+              <a:ext uri="{FF2B5EF4-FFF2-40B4-BE49-F238E27FC236}">
+                <a16:creationId xmlns:a16="http://schemas.microsoft.com/office/drawing/2014/main" id="{058983B3-0401-3E17-FA68-F129B3A42E48}"/>
+              </a:ext>
+            </a:extLst>
+          </p:cNvPr>
+          <p:cNvSpPr>
+            <a:spLocks noGrp="1"/>
+          </p:cNvSpPr>
+          <p:nvPr>
+            <p:ph type="ctrTitle"/>
+          </p:nvPr>
+        </p:nvSpPr>
+        <p:spPr/>
+        <p:txBody>
+          <a:bodyPr/>
+          <a:lstStyle/>
+          <a:p>
+            <a:r>
+              <a:rPr lang="en-US" dirty="0"/>
+              <a:t>Polynomial Chaos Sampling for Parametric Estimation</a:t>
+            </a:r>
+          </a:p>
+        </p:txBody>
+      </p:sp>
+      <p:sp>
+        <p:nvSpPr>
+          <p:cNvPr id="3" name="Subtitle 2">
+            <a:extLst>
+              <a:ext uri="{FF2B5EF4-FFF2-40B4-BE49-F238E27FC236}">
+                <a16:creationId xmlns:a16="http://schemas.microsoft.com/office/drawing/2014/main" id="{9DCFCAE8-31F0-71DF-7399-7BC9ACCEE79E}"/>
+              </a:ext>
+            </a:extLst>
+          </p:cNvPr>
+          <p:cNvSpPr>
+            <a:spLocks noGrp="1"/>
+          </p:cNvSpPr>
+          <p:nvPr>
+            <p:ph type="subTitle" idx="1"/>
+          </p:nvPr>
+        </p:nvSpPr>
+        <p:spPr/>
+        <p:txBody>
+          <a:bodyPr/>
+          <a:lstStyle/>
+          <a:p>
+            <a:r>
+              <a:rPr lang="en-US" dirty="0"/>
+              <a:t>Tye Phoenix</a:t>
+            </a:r>
+          </a:p>
+        </p:txBody>
+      </p:sp>
+    </p:spTree>
+    <p:extLst>
+      <p:ext uri="{BB962C8B-B14F-4D97-AF65-F5344CB8AC3E}">
+        <p14:creationId xmlns:p14="http://schemas.microsoft.com/office/powerpoint/2010/main" val="2092649409"/>
+      </p:ext>
+    </p:extLst>
+  </p:cSld>
+  <p:clrMapOvr>
+    <a:masterClrMapping/>
+  </p:clrMapOvr>
+</p:sld>
+</file>
+
+<file path=ppt/slides/slide11.xml><?xml version="1.0" encoding="utf-8"?>
+<p:sld xmlns:a="http://schemas.openxmlformats.org/drawingml/2006/main" xmlns:r="http://schemas.openxmlformats.org/officeDocument/2006/relationships" xmlns:p="http://schemas.openxmlformats.org/presentationml/2006/main">
+  <p:cSld>
+    <p:spTree>
+      <p:nvGrpSpPr>
+        <p:cNvPr id="1" name=""/>
+        <p:cNvGrpSpPr/>
+        <p:nvPr/>
+      </p:nvGrpSpPr>
+      <p:grpSpPr>
+        <a:xfrm>
+          <a:off x="0" y="0"/>
+          <a:ext cx="0" cy="0"/>
+          <a:chOff x="0" y="0"/>
+          <a:chExt cx="0" cy="0"/>
+        </a:xfrm>
+      </p:grpSpPr>
+      <p:sp>
+        <p:nvSpPr>
+          <p:cNvPr id="2" name="Title 1">
+            <a:extLst>
+              <a:ext uri="{FF2B5EF4-FFF2-40B4-BE49-F238E27FC236}">
+                <a16:creationId xmlns:a16="http://schemas.microsoft.com/office/drawing/2014/main" id="{1FC93C29-E8C9-BEA4-CA57-DA00ADA52493}"/>
+              </a:ext>
+            </a:extLst>
+          </p:cNvPr>
+          <p:cNvSpPr>
+            <a:spLocks noGrp="1"/>
+          </p:cNvSpPr>
+          <p:nvPr>
+            <p:ph type="title"/>
+          </p:nvPr>
+        </p:nvSpPr>
+        <p:spPr/>
+        <p:txBody>
+          <a:bodyPr/>
+          <a:lstStyle/>
+          <a:p>
+            <a:r>
+              <a:rPr lang="en-US" dirty="0"/>
+              <a:t>Single Tank Bilinear Reaction Network</a:t>
+            </a:r>
+          </a:p>
+        </p:txBody>
+      </p:sp>
+      <p:pic>
+        <p:nvPicPr>
+          <p:cNvPr id="5" name="Content Placeholder 4" descr="A graph of a function&#10;&#10;Description automatically generated">
+            <a:extLst>
+              <a:ext uri="{FF2B5EF4-FFF2-40B4-BE49-F238E27FC236}">
+                <a16:creationId xmlns:a16="http://schemas.microsoft.com/office/drawing/2014/main" id="{F4B41B91-39E5-A27A-37EC-535880E4C5B9}"/>
+              </a:ext>
+            </a:extLst>
+          </p:cNvPr>
+          <p:cNvPicPr>
+            <a:picLocks noGrp="1" noChangeAspect="1"/>
+          </p:cNvPicPr>
+          <p:nvPr>
+            <p:ph idx="1"/>
+          </p:nvPr>
+        </p:nvPicPr>
+        <p:blipFill>
+          <a:blip r:embed="rId2"/>
+          <a:stretch>
+            <a:fillRect/>
+          </a:stretch>
+        </p:blipFill>
+        <p:spPr>
+          <a:xfrm>
+            <a:off x="6768125" y="2133599"/>
+            <a:ext cx="4598852" cy="3065901"/>
+          </a:xfrm>
+        </p:spPr>
+      </p:pic>
+      <p:pic>
+        <p:nvPicPr>
+          <p:cNvPr id="7" name="Picture 6" descr="A graph of a line&#10;&#10;Description automatically generated">
+            <a:extLst>
+              <a:ext uri="{FF2B5EF4-FFF2-40B4-BE49-F238E27FC236}">
+                <a16:creationId xmlns:a16="http://schemas.microsoft.com/office/drawing/2014/main" id="{56910100-6E20-A902-26FD-03425E12E163}"/>
+              </a:ext>
+            </a:extLst>
+          </p:cNvPr>
+          <p:cNvPicPr>
+            <a:picLocks noChangeAspect="1"/>
+          </p:cNvPicPr>
+          <p:nvPr/>
+        </p:nvPicPr>
+        <p:blipFill>
+          <a:blip r:embed="rId3"/>
+          <a:stretch>
+            <a:fillRect/>
+          </a:stretch>
+        </p:blipFill>
+        <p:spPr>
+          <a:xfrm>
+            <a:off x="668722" y="2133599"/>
+            <a:ext cx="4598852" cy="3065901"/>
+          </a:xfrm>
+          <a:prstGeom prst="rect">
+            <a:avLst/>
+          </a:prstGeom>
+        </p:spPr>
+      </p:pic>
+      <p:cxnSp>
+        <p:nvCxnSpPr>
+          <p:cNvPr id="9" name="Straight Arrow Connector 8">
+            <a:extLst>
+              <a:ext uri="{FF2B5EF4-FFF2-40B4-BE49-F238E27FC236}">
+                <a16:creationId xmlns:a16="http://schemas.microsoft.com/office/drawing/2014/main" id="{B31D0C44-3A2E-FA84-E0C9-6542D860235C}"/>
+              </a:ext>
+            </a:extLst>
+          </p:cNvPr>
+          <p:cNvCxnSpPr/>
+          <p:nvPr/>
+        </p:nvCxnSpPr>
+        <p:spPr>
+          <a:xfrm>
+            <a:off x="5454869" y="3429000"/>
+            <a:ext cx="998483" cy="0"/>
+          </a:xfrm>
+          <a:prstGeom prst="straightConnector1">
+            <a:avLst/>
+          </a:prstGeom>
+          <a:ln>
+            <a:tailEnd type="triangle"/>
+          </a:ln>
+        </p:spPr>
+        <p:style>
+          <a:lnRef idx="2">
+            <a:schemeClr val="accent1"/>
+          </a:lnRef>
+          <a:fillRef idx="0">
+            <a:schemeClr val="accent1"/>
+          </a:fillRef>
+          <a:effectRef idx="1">
+            <a:schemeClr val="accent1"/>
+          </a:effectRef>
+          <a:fontRef idx="minor">
+            <a:schemeClr val="tx1"/>
+          </a:fontRef>
+        </p:style>
+      </p:cxnSp>
+      <p:sp>
+        <p:nvSpPr>
+          <p:cNvPr id="10" name="TextBox 9">
+            <a:extLst>
+              <a:ext uri="{FF2B5EF4-FFF2-40B4-BE49-F238E27FC236}">
+                <a16:creationId xmlns:a16="http://schemas.microsoft.com/office/drawing/2014/main" id="{55EC9225-C65E-51E1-9592-3A3694410A8C}"/>
+              </a:ext>
+            </a:extLst>
+          </p:cNvPr>
+          <p:cNvSpPr txBox="1"/>
+          <p:nvPr/>
+        </p:nvSpPr>
+        <p:spPr>
+          <a:xfrm>
+            <a:off x="969579" y="6020349"/>
+            <a:ext cx="10252841" cy="369332"/>
+          </a:xfrm>
+          <a:prstGeom prst="rect">
+            <a:avLst/>
+          </a:prstGeom>
+          <a:noFill/>
+        </p:spPr>
+        <p:txBody>
+          <a:bodyPr wrap="square" rtlCol="0">
+            <a:spAutoFit/>
+          </a:bodyPr>
+          <a:lstStyle/>
+          <a:p>
+            <a:r>
+              <a:rPr lang="en-US" i="1" dirty="0"/>
+              <a:t>*</a:t>
+            </a:r>
+            <a:r>
+              <a:rPr lang="en-US" i="1" dirty="0" err="1"/>
+              <a:t>PolyChaos.jl’s</a:t>
+            </a:r>
+            <a:r>
+              <a:rPr lang="en-US" i="1" dirty="0"/>
+              <a:t> algorithm seems to generate a randomly response? Different ensemble each iteration.</a:t>
+            </a:r>
+          </a:p>
+        </p:txBody>
+      </p:sp>
+    </p:spTree>
+    <p:extLst>
+      <p:ext uri="{BB962C8B-B14F-4D97-AF65-F5344CB8AC3E}">
+        <p14:creationId xmlns:p14="http://schemas.microsoft.com/office/powerpoint/2010/main" val="2147993155"/>
+      </p:ext>
+    </p:extLst>
+  </p:cSld>
+  <p:clrMapOvr>
+    <a:masterClrMapping/>
+  </p:clrMapOvr>
+</p:sld>
+</file>
+
+<file path=ppt/slides/slide12.xml><?xml version="1.0" encoding="utf-8"?>
+<p:sld xmlns:a="http://schemas.openxmlformats.org/drawingml/2006/main" xmlns:r="http://schemas.openxmlformats.org/officeDocument/2006/relationships" xmlns:p="http://schemas.openxmlformats.org/presentationml/2006/main">
+  <p:cSld>
+    <p:spTree>
+      <p:nvGrpSpPr>
+        <p:cNvPr id="1" name=""/>
+        <p:cNvGrpSpPr/>
+        <p:nvPr/>
+      </p:nvGrpSpPr>
+      <p:grpSpPr>
+        <a:xfrm>
+          <a:off x="0" y="0"/>
+          <a:ext cx="0" cy="0"/>
+          <a:chOff x="0" y="0"/>
+          <a:chExt cx="0" cy="0"/>
+        </a:xfrm>
+      </p:grpSpPr>
+      <p:sp>
+        <p:nvSpPr>
+          <p:cNvPr id="2" name="Title 1">
+            <a:extLst>
+              <a:ext uri="{FF2B5EF4-FFF2-40B4-BE49-F238E27FC236}">
+                <a16:creationId xmlns:a16="http://schemas.microsoft.com/office/drawing/2014/main" id="{B78CDBBB-F0C9-ED4D-8733-9435DDBBDC33}"/>
+              </a:ext>
+            </a:extLst>
+          </p:cNvPr>
+          <p:cNvSpPr>
+            <a:spLocks noGrp="1"/>
+          </p:cNvSpPr>
+          <p:nvPr>
+            <p:ph type="title"/>
+          </p:nvPr>
+        </p:nvSpPr>
+        <p:spPr/>
+        <p:txBody>
+          <a:bodyPr/>
+          <a:lstStyle/>
+          <a:p>
+            <a:r>
+              <a:rPr lang="en-US" dirty="0"/>
+              <a:t>Second-Order Reaction</a:t>
+            </a:r>
+          </a:p>
+        </p:txBody>
+      </p:sp>
+      <p:pic>
+        <p:nvPicPr>
+          <p:cNvPr id="5" name="Content Placeholder 4" descr="A graph of different colored lines&#10;&#10;Description automatically generated">
+            <a:extLst>
+              <a:ext uri="{FF2B5EF4-FFF2-40B4-BE49-F238E27FC236}">
+                <a16:creationId xmlns:a16="http://schemas.microsoft.com/office/drawing/2014/main" id="{93C11CD3-3964-4EEB-C529-8430187BEC2C}"/>
+              </a:ext>
+            </a:extLst>
+          </p:cNvPr>
+          <p:cNvPicPr>
+            <a:picLocks noGrp="1" noChangeAspect="1"/>
+          </p:cNvPicPr>
+          <p:nvPr>
+            <p:ph idx="1"/>
+          </p:nvPr>
+        </p:nvPicPr>
+        <p:blipFill>
+          <a:blip r:embed="rId2"/>
+          <a:stretch>
+            <a:fillRect/>
+          </a:stretch>
+        </p:blipFill>
+        <p:spPr>
+          <a:xfrm>
+            <a:off x="7055708" y="2190965"/>
+            <a:ext cx="4875420" cy="3250280"/>
+          </a:xfrm>
+        </p:spPr>
+      </p:pic>
+      <p:pic>
+        <p:nvPicPr>
+          <p:cNvPr id="7" name="Picture 6" descr="A graph of different colored lines&#10;&#10;Description automatically generated">
+            <a:extLst>
+              <a:ext uri="{FF2B5EF4-FFF2-40B4-BE49-F238E27FC236}">
+                <a16:creationId xmlns:a16="http://schemas.microsoft.com/office/drawing/2014/main" id="{CBEA6FD7-EA71-8A8E-D519-EEAFFAFA0F1D}"/>
+              </a:ext>
+            </a:extLst>
+          </p:cNvPr>
+          <p:cNvPicPr>
+            <a:picLocks noChangeAspect="1"/>
+          </p:cNvPicPr>
+          <p:nvPr/>
+        </p:nvPicPr>
+        <p:blipFill>
+          <a:blip r:embed="rId3"/>
+          <a:stretch>
+            <a:fillRect/>
+          </a:stretch>
+        </p:blipFill>
+        <p:spPr>
+          <a:xfrm>
+            <a:off x="260873" y="2239300"/>
+            <a:ext cx="4875420" cy="3250280"/>
+          </a:xfrm>
+          <a:prstGeom prst="rect">
+            <a:avLst/>
+          </a:prstGeom>
+        </p:spPr>
+      </p:pic>
+      <p:cxnSp>
+        <p:nvCxnSpPr>
+          <p:cNvPr id="9" name="Straight Arrow Connector 8">
+            <a:extLst>
+              <a:ext uri="{FF2B5EF4-FFF2-40B4-BE49-F238E27FC236}">
+                <a16:creationId xmlns:a16="http://schemas.microsoft.com/office/drawing/2014/main" id="{B4D4FC90-6317-C749-E8B1-3CA821461FB9}"/>
+              </a:ext>
+            </a:extLst>
+          </p:cNvPr>
+          <p:cNvCxnSpPr/>
+          <p:nvPr/>
+        </p:nvCxnSpPr>
+        <p:spPr>
+          <a:xfrm>
+            <a:off x="5433848" y="3657600"/>
+            <a:ext cx="1408386" cy="0"/>
+          </a:xfrm>
+          <a:prstGeom prst="straightConnector1">
+            <a:avLst/>
+          </a:prstGeom>
+          <a:ln>
+            <a:tailEnd type="triangle"/>
+          </a:ln>
+        </p:spPr>
+        <p:style>
+          <a:lnRef idx="2">
+            <a:schemeClr val="accent1"/>
+          </a:lnRef>
+          <a:fillRef idx="0">
+            <a:schemeClr val="accent1"/>
+          </a:fillRef>
+          <a:effectRef idx="1">
+            <a:schemeClr val="accent1"/>
+          </a:effectRef>
+          <a:fontRef idx="minor">
+            <a:schemeClr val="tx1"/>
+          </a:fontRef>
+        </p:style>
+      </p:cxnSp>
+      <p:sp>
+        <p:nvSpPr>
+          <p:cNvPr id="11" name="TextBox 10">
+            <a:extLst>
+              <a:ext uri="{FF2B5EF4-FFF2-40B4-BE49-F238E27FC236}">
+                <a16:creationId xmlns:a16="http://schemas.microsoft.com/office/drawing/2014/main" id="{7F303E18-7030-BDD5-6B07-A280EDF1F5A3}"/>
+              </a:ext>
+            </a:extLst>
+          </p:cNvPr>
+          <p:cNvSpPr txBox="1"/>
+          <p:nvPr/>
+        </p:nvSpPr>
+        <p:spPr>
+          <a:xfrm>
+            <a:off x="1208187" y="6038192"/>
+            <a:ext cx="9775625" cy="369332"/>
+          </a:xfrm>
+          <a:prstGeom prst="rect">
+            <a:avLst/>
+          </a:prstGeom>
+          <a:noFill/>
+        </p:spPr>
+        <p:txBody>
+          <a:bodyPr wrap="none" rtlCol="0">
+            <a:spAutoFit/>
+          </a:bodyPr>
+          <a:lstStyle/>
+          <a:p>
+            <a:r>
+              <a:rPr lang="en-US" i="1" dirty="0"/>
+              <a:t>*Trajectory propagation algorithm runtime down from ~0.15 seconds to ~0.05 seconds! 3x as fast!</a:t>
+            </a:r>
+          </a:p>
+        </p:txBody>
+      </p:sp>
+    </p:spTree>
+    <p:extLst>
+      <p:ext uri="{BB962C8B-B14F-4D97-AF65-F5344CB8AC3E}">
+        <p14:creationId xmlns:p14="http://schemas.microsoft.com/office/powerpoint/2010/main" val="1019468485"/>
+      </p:ext>
+    </p:extLst>
+  </p:cSld>
+  <p:clrMapOvr>
+    <a:masterClrMapping/>
+  </p:clrMapOvr>
+</p:sld>
+</file>
+
 <file path=ppt/slides/slide2.xml><?xml version="1.0" encoding="utf-8"?>
 <p:sld xmlns:a="http://schemas.openxmlformats.org/drawingml/2006/main" xmlns:r="http://schemas.openxmlformats.org/officeDocument/2006/relationships" xmlns:p="http://schemas.openxmlformats.org/presentationml/2006/main">
   <p:cSld>
@@ -4174,8 +4653,8 @@
           </a:p>
         </p:txBody>
       </p:sp>
-      <mc:AlternateContent xmlns:mc="http://schemas.openxmlformats.org/markup-compatibility/2006">
-        <mc:Choice xmlns:a14="http://schemas.microsoft.com/office/drawing/2010/main" Requires="a14">
+      <mc:AlternateContent xmlns:mc="http://schemas.openxmlformats.org/markup-compatibility/2006" xmlns:a14="http://schemas.microsoft.com/office/drawing/2010/main">
+        <mc:Choice Requires="a14">
           <p:sp>
             <p:nvSpPr>
               <p:cNvPr id="3" name="TextBox 2">
@@ -4204,6 +4683,7 @@
               </a:bodyPr>
               <a:lstStyle/>
               <a:p>
+                <a:pPr/>
                 <a14:m>
                   <m:oMathPara xmlns:m="http://schemas.openxmlformats.org/officeDocument/2006/math">
                     <m:oMathParaPr>
@@ -4275,7 +4755,7 @@
             </p:txBody>
           </p:sp>
         </mc:Choice>
-        <mc:Fallback>
+        <mc:Fallback xmlns="">
           <p:sp>
             <p:nvSpPr>
               <p:cNvPr id="3" name="TextBox 2">
@@ -4864,8 +5344,13 @@
           <a:p>
             <a:r>
               <a:rPr lang="en-US" dirty="0"/>
-              <a:t>Trajectory State Machine &amp; Maximize Algorithm</a:t>
-            </a:r>
+              <a:t>Trajectory State Machine &amp; Maximize Algorithm through </a:t>
+            </a:r>
+            <a:r>
+              <a:rPr lang="en-US" dirty="0" err="1"/>
+              <a:t>NLopt.jl</a:t>
+            </a:r>
+            <a:endParaRPr lang="en-US" dirty="0"/>
           </a:p>
         </p:txBody>
       </p:sp>
@@ -4930,10 +5415,10 @@
       </p:pic>
       <p:pic>
         <p:nvPicPr>
-          <p:cNvPr id="9" name="Picture 8" descr="A screenshot of a computer program&#10;&#10;Description automatically generated">
-            <a:extLst>
-              <a:ext uri="{FF2B5EF4-FFF2-40B4-BE49-F238E27FC236}">
-                <a16:creationId xmlns:a16="http://schemas.microsoft.com/office/drawing/2014/main" id="{AE6EA1FD-22F8-7C0B-7AA2-3A90EB09F571}"/>
+          <p:cNvPr id="4" name="Picture 3" descr="A screen shot of a computer program&#10;&#10;Description automatically generated">
+            <a:extLst>
+              <a:ext uri="{FF2B5EF4-FFF2-40B4-BE49-F238E27FC236}">
+                <a16:creationId xmlns:a16="http://schemas.microsoft.com/office/drawing/2014/main" id="{A32C402D-07AB-B3D3-99F0-C4AA198EFF62}"/>
               </a:ext>
             </a:extLst>
           </p:cNvPr>
@@ -4950,8 +5435,8 @@
         </p:blipFill>
         <p:spPr>
           <a:xfrm>
-            <a:off x="838200" y="1993900"/>
-            <a:ext cx="2184400" cy="2870200"/>
+            <a:off x="687333" y="2500368"/>
+            <a:ext cx="5499100" cy="2298700"/>
           </a:xfrm>
           <a:prstGeom prst="rect">
             <a:avLst/>

</xml_diff>